<commit_message>
Minor changes of the last meeting, formatting pages, figure memories fixed
</commit_message>
<xml_diff>
--- a/doc/Figures/TEMP/Memories.pptx
+++ b/doc/Figures/TEMP/Memories.pptx
@@ -262,7 +262,7 @@
           <a:p>
             <a:fld id="{26FC637F-6D84-43B3-9BD5-769FD492AFC5}" type="datetimeFigureOut">
               <a:rPr lang="es-ES" smtClean="0"/>
-              <a:t>24/10/2021</a:t>
+              <a:t>28/01/2022</a:t>
             </a:fld>
             <a:endParaRPr lang="es-ES"/>
           </a:p>
@@ -460,7 +460,7 @@
           <a:p>
             <a:fld id="{26FC637F-6D84-43B3-9BD5-769FD492AFC5}" type="datetimeFigureOut">
               <a:rPr lang="es-ES" smtClean="0"/>
-              <a:t>24/10/2021</a:t>
+              <a:t>28/01/2022</a:t>
             </a:fld>
             <a:endParaRPr lang="es-ES"/>
           </a:p>
@@ -668,7 +668,7 @@
           <a:p>
             <a:fld id="{26FC637F-6D84-43B3-9BD5-769FD492AFC5}" type="datetimeFigureOut">
               <a:rPr lang="es-ES" smtClean="0"/>
-              <a:t>24/10/2021</a:t>
+              <a:t>28/01/2022</a:t>
             </a:fld>
             <a:endParaRPr lang="es-ES"/>
           </a:p>
@@ -866,7 +866,7 @@
           <a:p>
             <a:fld id="{26FC637F-6D84-43B3-9BD5-769FD492AFC5}" type="datetimeFigureOut">
               <a:rPr lang="es-ES" smtClean="0"/>
-              <a:t>24/10/2021</a:t>
+              <a:t>28/01/2022</a:t>
             </a:fld>
             <a:endParaRPr lang="es-ES"/>
           </a:p>
@@ -1141,7 +1141,7 @@
           <a:p>
             <a:fld id="{26FC637F-6D84-43B3-9BD5-769FD492AFC5}" type="datetimeFigureOut">
               <a:rPr lang="es-ES" smtClean="0"/>
-              <a:t>24/10/2021</a:t>
+              <a:t>28/01/2022</a:t>
             </a:fld>
             <a:endParaRPr lang="es-ES"/>
           </a:p>
@@ -1406,7 +1406,7 @@
           <a:p>
             <a:fld id="{26FC637F-6D84-43B3-9BD5-769FD492AFC5}" type="datetimeFigureOut">
               <a:rPr lang="es-ES" smtClean="0"/>
-              <a:t>24/10/2021</a:t>
+              <a:t>28/01/2022</a:t>
             </a:fld>
             <a:endParaRPr lang="es-ES"/>
           </a:p>
@@ -1818,7 +1818,7 @@
           <a:p>
             <a:fld id="{26FC637F-6D84-43B3-9BD5-769FD492AFC5}" type="datetimeFigureOut">
               <a:rPr lang="es-ES" smtClean="0"/>
-              <a:t>24/10/2021</a:t>
+              <a:t>28/01/2022</a:t>
             </a:fld>
             <a:endParaRPr lang="es-ES"/>
           </a:p>
@@ -1959,7 +1959,7 @@
           <a:p>
             <a:fld id="{26FC637F-6D84-43B3-9BD5-769FD492AFC5}" type="datetimeFigureOut">
               <a:rPr lang="es-ES" smtClean="0"/>
-              <a:t>24/10/2021</a:t>
+              <a:t>28/01/2022</a:t>
             </a:fld>
             <a:endParaRPr lang="es-ES"/>
           </a:p>
@@ -2072,7 +2072,7 @@
           <a:p>
             <a:fld id="{26FC637F-6D84-43B3-9BD5-769FD492AFC5}" type="datetimeFigureOut">
               <a:rPr lang="es-ES" smtClean="0"/>
-              <a:t>24/10/2021</a:t>
+              <a:t>28/01/2022</a:t>
             </a:fld>
             <a:endParaRPr lang="es-ES"/>
           </a:p>
@@ -2383,7 +2383,7 @@
           <a:p>
             <a:fld id="{26FC637F-6D84-43B3-9BD5-769FD492AFC5}" type="datetimeFigureOut">
               <a:rPr lang="es-ES" smtClean="0"/>
-              <a:t>24/10/2021</a:t>
+              <a:t>28/01/2022</a:t>
             </a:fld>
             <a:endParaRPr lang="es-ES"/>
           </a:p>
@@ -2671,7 +2671,7 @@
           <a:p>
             <a:fld id="{26FC637F-6D84-43B3-9BD5-769FD492AFC5}" type="datetimeFigureOut">
               <a:rPr lang="es-ES" smtClean="0"/>
-              <a:t>24/10/2021</a:t>
+              <a:t>28/01/2022</a:t>
             </a:fld>
             <a:endParaRPr lang="es-ES"/>
           </a:p>
@@ -2912,7 +2912,7 @@
           <a:p>
             <a:fld id="{26FC637F-6D84-43B3-9BD5-769FD492AFC5}" type="datetimeFigureOut">
               <a:rPr lang="es-ES" smtClean="0"/>
-              <a:t>24/10/2021</a:t>
+              <a:t>28/01/2022</a:t>
             </a:fld>
             <a:endParaRPr lang="es-ES"/>
           </a:p>
@@ -5319,8 +5319,8 @@
         </p:nvSpPr>
         <p:spPr>
           <a:xfrm>
-            <a:off x="1893779" y="5136726"/>
-            <a:ext cx="2542036" cy="1374596"/>
+            <a:off x="1829154" y="5817457"/>
+            <a:ext cx="2542036" cy="1766554"/>
           </a:xfrm>
           <a:prstGeom prst="rect">
             <a:avLst/>
@@ -5355,7 +5355,7 @@
           <a:p>
             <a:pPr algn="ctr"/>
             <a:r>
-              <a:rPr lang="es-ES" sz="1400" b="1" dirty="0">
+              <a:rPr lang="es-ES" sz="1600" b="1" dirty="0">
                 <a:solidFill>
                   <a:schemeClr val="tx1"/>
                 </a:solidFill>
@@ -5366,7 +5366,7 @@
           <a:p>
             <a:pPr algn="ctr"/>
             <a:r>
-              <a:rPr lang="es-ES" sz="1400" b="1" dirty="0">
+              <a:rPr lang="es-ES" sz="1600" b="1" dirty="0">
                 <a:solidFill>
                   <a:schemeClr val="tx1"/>
                 </a:solidFill>
@@ -5377,7 +5377,7 @@
           <a:p>
             <a:pPr algn="ctr"/>
             <a:r>
-              <a:rPr lang="es-ES" sz="1400" b="1" dirty="0">
+              <a:rPr lang="es-ES" sz="1600" b="1" dirty="0">
                 <a:solidFill>
                   <a:schemeClr val="tx1"/>
                 </a:solidFill>
@@ -5388,7 +5388,7 @@
           <a:p>
             <a:pPr algn="ctr"/>
             <a:r>
-              <a:rPr lang="es-ES" sz="1400" b="1" dirty="0">
+              <a:rPr lang="es-ES" sz="1600" b="1" dirty="0">
                 <a:solidFill>
                   <a:schemeClr val="tx1"/>
                 </a:solidFill>
@@ -5399,7 +5399,7 @@
           <a:p>
             <a:pPr algn="ctr"/>
             <a:r>
-              <a:rPr lang="en-GB" sz="1400" b="1" dirty="0">
+              <a:rPr lang="en-GB" sz="1600" b="1" dirty="0">
                 <a:solidFill>
                   <a:schemeClr val="tx1"/>
                 </a:solidFill>
@@ -5407,7 +5407,7 @@
               <a:t>Source</a:t>
             </a:r>
             <a:r>
-              <a:rPr lang="es-ES" sz="1400" b="1" dirty="0">
+              <a:rPr lang="es-ES" sz="1600" b="1" dirty="0">
                 <a:solidFill>
                   <a:schemeClr val="tx1"/>
                 </a:solidFill>
@@ -5415,7 +5415,7 @@
               <a:t> </a:t>
             </a:r>
             <a:r>
-              <a:rPr lang="en-US" sz="1400" b="1" dirty="0">
+              <a:rPr lang="en-US" sz="1600" b="1" dirty="0">
                 <a:solidFill>
                   <a:schemeClr val="tx1"/>
                 </a:solidFill>
@@ -5439,8 +5439,8 @@
         </p:nvSpPr>
         <p:spPr>
           <a:xfrm>
-            <a:off x="1456891" y="2859385"/>
-            <a:ext cx="3449149" cy="1754326"/>
+            <a:off x="1730410" y="2872123"/>
+            <a:ext cx="3693716" cy="2554545"/>
           </a:xfrm>
           <a:prstGeom prst="rect">
             <a:avLst/>
@@ -5448,7 +5448,7 @@
           <a:noFill/>
         </p:spPr>
         <p:txBody>
-          <a:bodyPr wrap="none" rtlCol="0">
+          <a:bodyPr wrap="square" rtlCol="0">
             <a:spAutoFit/>
           </a:bodyPr>
           <a:lstStyle/>
@@ -5458,7 +5458,7 @@
               <a:buChar char="•"/>
             </a:pPr>
             <a:r>
-              <a:rPr lang="en-US" sz="1200" b="1" dirty="0"/>
+              <a:rPr lang="en-US" sz="1600" b="1" dirty="0"/>
               <a:t>Static allocation</a:t>
             </a:r>
           </a:p>
@@ -5468,7 +5468,7 @@
               <a:buChar char="•"/>
             </a:pPr>
             <a:r>
-              <a:rPr lang="en-US" sz="1200" dirty="0"/>
+              <a:rPr lang="en-US" sz="1600" dirty="0"/>
               <a:t>Fixed address and size</a:t>
             </a:r>
           </a:p>
@@ -5478,7 +5478,7 @@
               <a:buChar char="•"/>
             </a:pPr>
             <a:r>
-              <a:rPr lang="en-US" sz="1200" dirty="0"/>
+              <a:rPr lang="en-US" sz="1600" dirty="0"/>
               <a:t>Freed when program finishes</a:t>
             </a:r>
           </a:p>
@@ -5487,69 +5487,62 @@
               <a:buFont typeface="Arial" panose="020B0604020202020204" pitchFamily="34" charset="0"/>
               <a:buChar char="•"/>
             </a:pPr>
-            <a:endParaRPr lang="en-US" sz="1200" dirty="0"/>
+            <a:r>
+              <a:rPr lang="en-US" sz="1600" dirty="0">
+                <a:latin typeface="Consolas" panose="020B0609020204030204" pitchFamily="49" charset="0"/>
+              </a:rPr>
+              <a:t>STATIC</a:t>
+            </a:r>
+            <a:r>
+              <a:rPr lang="en-US" sz="1600" dirty="0"/>
+              <a:t> (subprograms) and </a:t>
+            </a:r>
+            <a:r>
+              <a:rPr lang="en-US" sz="1600" dirty="0">
+                <a:latin typeface="Consolas" panose="020B0609020204030204" pitchFamily="49" charset="0"/>
+              </a:rPr>
+              <a:t>SAVE</a:t>
+            </a:r>
+            <a:r>
+              <a:rPr lang="en-US" sz="1600" dirty="0"/>
+              <a:t> attributes</a:t>
+            </a:r>
           </a:p>
           <a:p>
             <a:pPr marL="285750" indent="-285750">
               <a:buFont typeface="Arial" panose="020B0604020202020204" pitchFamily="34" charset="0"/>
               <a:buChar char="•"/>
             </a:pPr>
-            <a:r>
-              <a:rPr lang="en-US" sz="1200" dirty="0">
-                <a:latin typeface="Consolas" panose="020B0609020204030204" pitchFamily="49" charset="0"/>
-              </a:rPr>
-              <a:t>STATIC</a:t>
-            </a:r>
-            <a:r>
-              <a:rPr lang="en-US" sz="1200" dirty="0"/>
-              <a:t> (subprograms) and </a:t>
-            </a:r>
-            <a:r>
-              <a:rPr lang="en-US" sz="1200" dirty="0">
-                <a:latin typeface="Consolas" panose="020B0609020204030204" pitchFamily="49" charset="0"/>
-              </a:rPr>
-              <a:t>SAVE</a:t>
-            </a:r>
-            <a:r>
-              <a:rPr lang="en-US" sz="1200" dirty="0"/>
-              <a:t> attributes</a:t>
-            </a:r>
+            <a:endParaRPr lang="en-US" sz="1600" dirty="0"/>
           </a:p>
           <a:p>
             <a:pPr marL="285750" indent="-285750">
               <a:buFont typeface="Arial" panose="020B0604020202020204" pitchFamily="34" charset="0"/>
               <a:buChar char="•"/>
             </a:pPr>
-            <a:endParaRPr lang="en-US" sz="1200" dirty="0"/>
+            <a:r>
+              <a:rPr lang="en-US" sz="1600" dirty="0">
+                <a:solidFill>
+                  <a:schemeClr val="accent6"/>
+                </a:solidFill>
+              </a:rPr>
+              <a:t>Easy and fast allocation</a:t>
+            </a:r>
           </a:p>
           <a:p>
             <a:pPr marL="285750" indent="-285750">
               <a:buFont typeface="Arial" panose="020B0604020202020204" pitchFamily="34" charset="0"/>
               <a:buChar char="•"/>
             </a:pPr>
-            <a:r>
-              <a:rPr lang="en-US" sz="1200" dirty="0">
-                <a:solidFill>
-                  <a:schemeClr val="accent6"/>
-                </a:solidFill>
-              </a:rPr>
-              <a:t>Easy and fast allocation</a:t>
-            </a:r>
+            <a:endParaRPr lang="en-US" sz="1600" dirty="0"/>
           </a:p>
           <a:p>
             <a:pPr marL="285750" indent="-285750">
               <a:buFont typeface="Arial" panose="020B0604020202020204" pitchFamily="34" charset="0"/>
               <a:buChar char="•"/>
             </a:pPr>
-            <a:endParaRPr lang="en-US" sz="1200" dirty="0"/>
-          </a:p>
-          <a:p>
-            <a:pPr marL="285750" indent="-285750">
-              <a:buFont typeface="Arial" panose="020B0604020202020204" pitchFamily="34" charset="0"/>
-              <a:buChar char="•"/>
-            </a:pPr>
-            <a:r>
-              <a:rPr lang="en-US" sz="1200" dirty="0">
+            <a:r>
+              <a:rPr lang="en-US" sz="1600" dirty="0">
                 <a:solidFill>
                   <a:srgbClr val="FF0000"/>
                 </a:solidFill>
@@ -5573,8 +5566,8 @@
         </p:nvSpPr>
         <p:spPr>
           <a:xfrm>
-            <a:off x="187224" y="6380517"/>
-            <a:ext cx="1689886" cy="261610"/>
+            <a:off x="4407421" y="7369695"/>
+            <a:ext cx="2374881" cy="338554"/>
           </a:xfrm>
           <a:prstGeom prst="rect">
             <a:avLst/>
@@ -5582,14 +5575,14 @@
           <a:noFill/>
         </p:spPr>
         <p:txBody>
-          <a:bodyPr wrap="none" rtlCol="0">
+          <a:bodyPr wrap="square" rtlCol="0">
             <a:spAutoFit/>
           </a:bodyPr>
           <a:lstStyle/>
           <a:p>
             <a:r>
-              <a:rPr lang="en-US" sz="1100" dirty="0"/>
-              <a:t>Lower memory address →</a:t>
+              <a:rPr lang="en-US" sz="1600" dirty="0"/>
+              <a:t>← Lower memory address</a:t>
             </a:r>
           </a:p>
         </p:txBody>
@@ -5608,8 +5601,8 @@
         </p:nvSpPr>
         <p:spPr>
           <a:xfrm>
-            <a:off x="1893779" y="4875116"/>
-            <a:ext cx="590226" cy="261610"/>
+            <a:off x="1776720" y="5451898"/>
+            <a:ext cx="738792" cy="338554"/>
           </a:xfrm>
           <a:prstGeom prst="rect">
             <a:avLst/>
@@ -5623,13 +5616,18 @@
           <a:lstStyle/>
           <a:p>
             <a:r>
-              <a:rPr lang="en-US" sz="1100" b="1" dirty="0">
+              <a:rPr lang="en-US" sz="1600" b="1" dirty="0">
                 <a:solidFill>
                   <a:srgbClr val="FF0000"/>
                 </a:solidFill>
               </a:rPr>
               <a:t>STATIC</a:t>
             </a:r>
+            <a:endParaRPr lang="en-US" sz="1100" b="1" dirty="0">
+              <a:solidFill>
+                <a:srgbClr val="FF0000"/>
+              </a:solidFill>
+            </a:endParaRPr>
           </a:p>
         </p:txBody>
       </p:sp>
@@ -5647,7 +5645,7 @@
         </p:nvSpPr>
         <p:spPr>
           <a:xfrm>
-            <a:off x="6485169" y="1924407"/>
+            <a:off x="6501838" y="-2285326"/>
             <a:ext cx="2542036" cy="4067479"/>
           </a:xfrm>
           <a:prstGeom prst="rect">
@@ -5763,7 +5761,7 @@
           <a:p>
             <a:pPr algn="ctr"/>
             <a:r>
-              <a:rPr lang="en-US" sz="1400" b="1" dirty="0">
+              <a:rPr lang="en-US" sz="1600" b="1" dirty="0">
                 <a:solidFill>
                   <a:schemeClr val="tx1"/>
                 </a:solidFill>
@@ -5774,7 +5772,7 @@
           <a:p>
             <a:pPr algn="ctr"/>
             <a:r>
-              <a:rPr lang="en-US" sz="1400" b="1" dirty="0">
+              <a:rPr lang="en-US" sz="1600" b="1" dirty="0">
                 <a:solidFill>
                   <a:schemeClr val="tx1"/>
                 </a:solidFill>
@@ -5785,7 +5783,7 @@
           <a:p>
             <a:pPr algn="ctr"/>
             <a:r>
-              <a:rPr lang="en-US" sz="1400" b="1" dirty="0">
+              <a:rPr lang="en-US" sz="1600" b="1" dirty="0">
                 <a:solidFill>
                   <a:schemeClr val="tx1"/>
                 </a:solidFill>
@@ -5796,7 +5794,7 @@
           <a:p>
             <a:pPr algn="ctr"/>
             <a:r>
-              <a:rPr lang="en-US" sz="1400" b="1" dirty="0">
+              <a:rPr lang="en-US" sz="1600" b="1" dirty="0">
                 <a:solidFill>
                   <a:schemeClr val="tx1"/>
                 </a:solidFill>
@@ -5807,7 +5805,7 @@
           <a:p>
             <a:pPr algn="ctr"/>
             <a:r>
-              <a:rPr lang="en-US" sz="1400" b="1" dirty="0">
+              <a:rPr lang="en-US" sz="1600" b="1" dirty="0">
                 <a:solidFill>
                   <a:schemeClr val="tx1"/>
                 </a:solidFill>
@@ -5831,8 +5829,8 @@
         </p:nvSpPr>
         <p:spPr>
           <a:xfrm>
-            <a:off x="5607596" y="-1276099"/>
-            <a:ext cx="4147482" cy="2308324"/>
+            <a:off x="5598705" y="2055252"/>
+            <a:ext cx="4150889" cy="3877985"/>
           </a:xfrm>
           <a:prstGeom prst="rect">
             <a:avLst/>
@@ -5840,7 +5838,7 @@
           <a:noFill/>
         </p:spPr>
         <p:txBody>
-          <a:bodyPr wrap="none" rtlCol="0">
+          <a:bodyPr wrap="square" rtlCol="0">
             <a:spAutoFit/>
           </a:bodyPr>
           <a:lstStyle/>
@@ -5850,7 +5848,7 @@
               <a:buChar char="•"/>
             </a:pPr>
             <a:r>
-              <a:rPr lang="en-US" sz="1200" b="1" dirty="0"/>
+              <a:rPr lang="en-US" sz="1600" b="1" dirty="0"/>
               <a:t>Dynamic allocation</a:t>
             </a:r>
           </a:p>
@@ -5860,7 +5858,7 @@
               <a:buChar char="•"/>
             </a:pPr>
             <a:r>
-              <a:rPr lang="en-US" sz="1200" dirty="0"/>
+              <a:rPr lang="en-US" sz="1600" dirty="0"/>
               <a:t>Size decided by the programmer</a:t>
             </a:r>
           </a:p>
@@ -5870,7 +5868,7 @@
               <a:buChar char="•"/>
             </a:pPr>
             <a:r>
-              <a:rPr lang="en-US" sz="1200" dirty="0"/>
+              <a:rPr lang="en-US" sz="1600" dirty="0"/>
               <a:t>Freed when programmer decides</a:t>
             </a:r>
           </a:p>
@@ -5879,7 +5877,7 @@
               <a:buFont typeface="Arial" panose="020B0604020202020204" pitchFamily="34" charset="0"/>
               <a:buChar char="•"/>
             </a:pPr>
-            <a:endParaRPr lang="en-US" sz="1200" dirty="0"/>
+            <a:endParaRPr lang="en-US" sz="1600" dirty="0"/>
           </a:p>
           <a:p>
             <a:pPr marL="285750" indent="-285750">
@@ -5887,27 +5885,27 @@
               <a:buChar char="•"/>
             </a:pPr>
             <a:r>
-              <a:rPr lang="en-US" sz="1200" dirty="0">
+              <a:rPr lang="en-US" sz="1600" dirty="0">
                 <a:latin typeface="Consolas" panose="020B0609020204030204" pitchFamily="49" charset="0"/>
               </a:rPr>
               <a:t>ALLOCATABLE</a:t>
             </a:r>
             <a:r>
-              <a:rPr lang="en-US" sz="1200" dirty="0"/>
+              <a:rPr lang="en-US" sz="1600" dirty="0"/>
               <a:t> attribute, </a:t>
             </a:r>
             <a:r>
-              <a:rPr lang="en-US" sz="1200" dirty="0">
+              <a:rPr lang="en-US" sz="1600" dirty="0">
                 <a:latin typeface="Consolas" panose="020B0609020204030204" pitchFamily="49" charset="0"/>
               </a:rPr>
               <a:t>ALLOCATE()</a:t>
             </a:r>
             <a:r>
-              <a:rPr lang="en-US" sz="1200" dirty="0"/>
+              <a:rPr lang="en-US" sz="1600" dirty="0"/>
               <a:t>, </a:t>
             </a:r>
             <a:r>
-              <a:rPr lang="en-US" sz="1200" dirty="0">
+              <a:rPr lang="en-US" sz="1600" dirty="0">
                 <a:latin typeface="Consolas" panose="020B0609020204030204" pitchFamily="49" charset="0"/>
               </a:rPr>
               <a:t>DEALLOCATE()</a:t>
@@ -5918,7 +5916,7 @@
               <a:buFont typeface="Arial" panose="020B0604020202020204" pitchFamily="34" charset="0"/>
               <a:buChar char="•"/>
             </a:pPr>
-            <a:endParaRPr lang="en-US" sz="1200" dirty="0"/>
+            <a:endParaRPr lang="en-US" sz="1600" dirty="0"/>
           </a:p>
           <a:p>
             <a:pPr marL="285750" indent="-285750">
@@ -5926,7 +5924,7 @@
               <a:buChar char="•"/>
             </a:pPr>
             <a:r>
-              <a:rPr lang="en-US" sz="1200" dirty="0">
+              <a:rPr lang="en-US" sz="1600" dirty="0">
                 <a:solidFill>
                   <a:schemeClr val="accent6"/>
                 </a:solidFill>
@@ -5940,7 +5938,7 @@
               <a:buChar char="•"/>
             </a:pPr>
             <a:r>
-              <a:rPr lang="en-US" sz="1200" dirty="0">
+              <a:rPr lang="en-US" sz="1600" dirty="0">
                 <a:solidFill>
                   <a:schemeClr val="accent6"/>
                 </a:solidFill>
@@ -5949,7 +5947,7 @@
             </a:r>
           </a:p>
           <a:p>
-            <a:endParaRPr lang="en-US" sz="1200" dirty="0"/>
+            <a:endParaRPr lang="en-US" sz="1600" dirty="0"/>
           </a:p>
           <a:p>
             <a:pPr marL="285750" indent="-285750">
@@ -5957,7 +5955,7 @@
               <a:buChar char="•"/>
             </a:pPr>
             <a:r>
-              <a:rPr lang="en-US" sz="1200" dirty="0">
+              <a:rPr lang="en-US" sz="1600" dirty="0">
                 <a:solidFill>
                   <a:srgbClr val="FF0000"/>
                 </a:solidFill>
@@ -5971,7 +5969,7 @@
               <a:buChar char="•"/>
             </a:pPr>
             <a:r>
-              <a:rPr lang="en-US" sz="1200" dirty="0">
+              <a:rPr lang="en-US" sz="1600" dirty="0">
                 <a:solidFill>
                   <a:srgbClr val="FF0000"/>
                 </a:solidFill>
@@ -5985,7 +5983,7 @@
               <a:buChar char="•"/>
             </a:pPr>
             <a:r>
-              <a:rPr lang="en-US" sz="1200" i="1" dirty="0">
+              <a:rPr lang="en-US" sz="1600" i="1" dirty="0">
                 <a:solidFill>
                   <a:srgbClr val="FF0000"/>
                 </a:solidFill>
@@ -5993,7 +5991,7 @@
               <a:t>Memory leak </a:t>
             </a:r>
             <a:r>
-              <a:rPr lang="en-US" sz="1200" dirty="0">
+              <a:rPr lang="en-US" sz="1600" dirty="0">
                 <a:solidFill>
                   <a:srgbClr val="FF0000"/>
                 </a:solidFill>
@@ -6017,8 +6015,8 @@
         </p:nvSpPr>
         <p:spPr>
           <a:xfrm>
-            <a:off x="6468500" y="1662797"/>
-            <a:ext cx="503664" cy="261610"/>
+            <a:off x="6449424" y="-2646676"/>
+            <a:ext cx="645433" cy="338554"/>
           </a:xfrm>
           <a:prstGeom prst="rect">
             <a:avLst/>
@@ -6032,7 +6030,7 @@
           <a:lstStyle/>
           <a:p>
             <a:r>
-              <a:rPr lang="en-US" sz="1100" b="1" dirty="0">
+              <a:rPr lang="en-US" sz="1600" b="1" dirty="0">
                 <a:solidFill>
                   <a:schemeClr val="accent2"/>
                 </a:solidFill>
@@ -6056,8 +6054,8 @@
         </p:nvSpPr>
         <p:spPr>
           <a:xfrm>
-            <a:off x="6637569" y="2076808"/>
-            <a:ext cx="1136441" cy="507999"/>
+            <a:off x="6654238" y="-2132925"/>
+            <a:ext cx="1351034" cy="507999"/>
           </a:xfrm>
           <a:prstGeom prst="rect">
             <a:avLst/>
@@ -6114,7 +6112,7 @@
         </p:nvSpPr>
         <p:spPr>
           <a:xfrm>
-            <a:off x="8119548" y="2409552"/>
+            <a:off x="8136217" y="-1800181"/>
             <a:ext cx="610661" cy="350509"/>
           </a:xfrm>
           <a:prstGeom prst="rect">
@@ -6172,7 +6170,7 @@
         </p:nvSpPr>
         <p:spPr>
           <a:xfrm>
-            <a:off x="6900458" y="2838802"/>
+            <a:off x="6917127" y="-1370931"/>
             <a:ext cx="610661" cy="426720"/>
           </a:xfrm>
           <a:prstGeom prst="rect">
@@ -6230,7 +6228,7 @@
         </p:nvSpPr>
         <p:spPr>
           <a:xfrm>
-            <a:off x="7700940" y="3069952"/>
+            <a:off x="7717609" y="-1139781"/>
             <a:ext cx="1136441" cy="995903"/>
           </a:xfrm>
           <a:prstGeom prst="rect">
@@ -6288,8 +6286,8 @@
         </p:nvSpPr>
         <p:spPr>
           <a:xfrm>
-            <a:off x="7681337" y="3122095"/>
-            <a:ext cx="607859" cy="246221"/>
+            <a:off x="7698006" y="-1087638"/>
+            <a:ext cx="780983" cy="307777"/>
           </a:xfrm>
           <a:prstGeom prst="rect">
             <a:avLst/>
@@ -6303,24 +6301,24 @@
           <a:lstStyle/>
           <a:p>
             <a:r>
-              <a:rPr lang="en-US" sz="1000" dirty="0">
+              <a:rPr lang="en-US" sz="1400" dirty="0">
                 <a:latin typeface="Consolas" panose="020B0609020204030204" pitchFamily="49" charset="0"/>
               </a:rPr>
               <a:t>A(</a:t>
             </a:r>
             <a:r>
-              <a:rPr lang="en-US" sz="1000" dirty="0" err="1">
+              <a:rPr lang="en-US" sz="1400" dirty="0" err="1">
                 <a:latin typeface="Consolas" panose="020B0609020204030204" pitchFamily="49" charset="0"/>
               </a:rPr>
               <a:t>n,n</a:t>
             </a:r>
             <a:r>
-              <a:rPr lang="en-US" sz="1000" dirty="0">
+              <a:rPr lang="en-US" sz="1400" dirty="0">
                 <a:latin typeface="Consolas" panose="020B0609020204030204" pitchFamily="49" charset="0"/>
               </a:rPr>
               <a:t>)</a:t>
             </a:r>
-            <a:endParaRPr lang="en-US" sz="1100" dirty="0">
+            <a:endParaRPr lang="en-US" dirty="0">
               <a:latin typeface="Consolas" panose="020B0609020204030204" pitchFamily="49" charset="0"/>
             </a:endParaRPr>
           </a:p>
@@ -6340,8 +6338,8 @@
         </p:nvSpPr>
         <p:spPr>
           <a:xfrm>
-            <a:off x="6597929" y="2086963"/>
-            <a:ext cx="960519" cy="246221"/>
+            <a:off x="6614598" y="-2122770"/>
+            <a:ext cx="1277914" cy="307777"/>
           </a:xfrm>
           <a:prstGeom prst="rect">
             <a:avLst/>
@@ -6355,12 +6353,12 @@
           <a:lstStyle/>
           <a:p>
             <a:r>
-              <a:rPr lang="en-US" sz="1000" dirty="0">
+              <a:rPr lang="en-US" sz="1400" dirty="0">
                 <a:latin typeface="Consolas" panose="020B0609020204030204" pitchFamily="49" charset="0"/>
               </a:rPr>
               <a:t>L(n1,n2,n3)</a:t>
             </a:r>
-            <a:endParaRPr lang="en-US" sz="1100" dirty="0">
+            <a:endParaRPr lang="en-US" dirty="0">
               <a:latin typeface="Consolas" panose="020B0609020204030204" pitchFamily="49" charset="0"/>
             </a:endParaRPr>
           </a:p>
@@ -6381,7 +6379,7 @@
         <p:spPr>
           <a:xfrm>
             <a:off x="1877110" y="-552985"/>
-            <a:ext cx="2542036" cy="2942595"/>
+            <a:ext cx="2542036" cy="3150965"/>
           </a:xfrm>
           <a:prstGeom prst="rect">
             <a:avLst/>
@@ -6472,7 +6470,7 @@
           <a:p>
             <a:pPr algn="ctr"/>
             <a:r>
-              <a:rPr lang="es-ES" sz="1400" b="1" dirty="0">
+              <a:rPr lang="es-ES" sz="1600" b="1" dirty="0">
                 <a:solidFill>
                   <a:schemeClr val="tx1"/>
                 </a:solidFill>
@@ -6483,7 +6481,7 @@
           <a:p>
             <a:pPr algn="ctr"/>
             <a:r>
-              <a:rPr lang="en-US" sz="1400" b="1" dirty="0">
+              <a:rPr lang="en-US" sz="1600" b="1" dirty="0">
                 <a:solidFill>
                   <a:schemeClr val="tx1"/>
                 </a:solidFill>
@@ -6494,7 +6492,7 @@
           <a:p>
             <a:pPr algn="ctr"/>
             <a:r>
-              <a:rPr lang="en-US" sz="1400" b="1" dirty="0">
+              <a:rPr lang="en-US" sz="1600" b="1" dirty="0">
                 <a:solidFill>
                   <a:schemeClr val="tx1"/>
                 </a:solidFill>
@@ -6505,7 +6503,7 @@
           <a:p>
             <a:pPr algn="ctr"/>
             <a:r>
-              <a:rPr lang="en-US" sz="1400" b="1" dirty="0">
+              <a:rPr lang="en-US" sz="1600" b="1" dirty="0">
                 <a:solidFill>
                   <a:schemeClr val="tx1"/>
                 </a:solidFill>
@@ -6516,7 +6514,7 @@
           <a:p>
             <a:pPr algn="ctr"/>
             <a:r>
-              <a:rPr lang="en-US" sz="1400" b="1" dirty="0">
+              <a:rPr lang="en-US" sz="1600" b="1" dirty="0">
                 <a:solidFill>
                   <a:schemeClr val="tx1"/>
                 </a:solidFill>
@@ -6527,13 +6525,18 @@
           <a:p>
             <a:pPr algn="ctr"/>
             <a:r>
-              <a:rPr lang="en-US" sz="1400" b="1" dirty="0">
+              <a:rPr lang="en-US" sz="1600" b="1" dirty="0">
                 <a:solidFill>
                   <a:schemeClr val="tx1"/>
                 </a:solidFill>
               </a:rPr>
               <a:t>Temporary arrays</a:t>
             </a:r>
+            <a:endParaRPr lang="en-US" sz="1400" b="1" dirty="0">
+              <a:solidFill>
+                <a:schemeClr val="tx1"/>
+              </a:solidFill>
+            </a:endParaRPr>
           </a:p>
         </p:txBody>
       </p:sp>
@@ -6551,8 +6554,8 @@
         </p:nvSpPr>
         <p:spPr>
           <a:xfrm>
-            <a:off x="1456891" y="-3180663"/>
-            <a:ext cx="3732304" cy="2123658"/>
+            <a:off x="1741044" y="-4023094"/>
+            <a:ext cx="3694229" cy="3046988"/>
           </a:xfrm>
           <a:prstGeom prst="rect">
             <a:avLst/>
@@ -6560,7 +6563,7 @@
           <a:noFill/>
         </p:spPr>
         <p:txBody>
-          <a:bodyPr wrap="none" rtlCol="0">
+          <a:bodyPr wrap="square" rtlCol="0">
             <a:spAutoFit/>
           </a:bodyPr>
           <a:lstStyle/>
@@ -6570,7 +6573,7 @@
               <a:buChar char="•"/>
             </a:pPr>
             <a:r>
-              <a:rPr lang="en-US" sz="1200" b="1" dirty="0"/>
+              <a:rPr lang="en-US" sz="1600" b="1" dirty="0"/>
               <a:t>Automatic allocation</a:t>
             </a:r>
           </a:p>
@@ -6580,7 +6583,7 @@
               <a:buChar char="•"/>
             </a:pPr>
             <a:r>
-              <a:rPr lang="en-US" sz="1200" dirty="0"/>
+              <a:rPr lang="en-US" sz="1600" dirty="0"/>
               <a:t>Managed by the machine</a:t>
             </a:r>
           </a:p>
@@ -6590,7 +6593,7 @@
               <a:buChar char="•"/>
             </a:pPr>
             <a:r>
-              <a:rPr lang="en-US" sz="1200" dirty="0"/>
+              <a:rPr lang="en-US" sz="1600" dirty="0"/>
               <a:t>Freed when a routine returns</a:t>
             </a:r>
           </a:p>
@@ -6599,33 +6602,40 @@
               <a:buFont typeface="Arial" panose="020B0604020202020204" pitchFamily="34" charset="0"/>
               <a:buChar char="•"/>
             </a:pPr>
-            <a:endParaRPr lang="en-US" sz="1200" dirty="0"/>
+            <a:r>
+              <a:rPr lang="en-US" sz="1600" dirty="0">
+                <a:latin typeface="Consolas" panose="020B0609020204030204" pitchFamily="49" charset="0"/>
+              </a:rPr>
+              <a:t>AUTOMATIC</a:t>
+            </a:r>
+            <a:r>
+              <a:rPr lang="en-US" sz="1600" dirty="0"/>
+              <a:t> attribute in subprograms</a:t>
+            </a:r>
+            <a:endParaRPr lang="en-US" sz="1600" dirty="0">
+              <a:latin typeface="Consolas" panose="020B0609020204030204" pitchFamily="49" charset="0"/>
+            </a:endParaRPr>
           </a:p>
           <a:p>
             <a:pPr marL="285750" indent="-285750">
               <a:buFont typeface="Arial" panose="020B0604020202020204" pitchFamily="34" charset="0"/>
               <a:buChar char="•"/>
             </a:pPr>
-            <a:r>
-              <a:rPr lang="en-US" sz="1200" dirty="0">
-                <a:latin typeface="Consolas" panose="020B0609020204030204" pitchFamily="49" charset="0"/>
-              </a:rPr>
-              <a:t>AUTOMATIC</a:t>
-            </a:r>
-            <a:r>
-              <a:rPr lang="en-US" sz="1200" dirty="0"/>
-              <a:t> attribute in subprograms</a:t>
-            </a:r>
-            <a:endParaRPr lang="en-US" sz="1200" dirty="0">
-              <a:latin typeface="Consolas" panose="020B0609020204030204" pitchFamily="49" charset="0"/>
-            </a:endParaRPr>
+            <a:endParaRPr lang="en-US" sz="1600" dirty="0"/>
           </a:p>
           <a:p>
             <a:pPr marL="285750" indent="-285750">
               <a:buFont typeface="Arial" panose="020B0604020202020204" pitchFamily="34" charset="0"/>
               <a:buChar char="•"/>
             </a:pPr>
-            <a:endParaRPr lang="en-US" sz="1200" dirty="0"/>
+            <a:r>
+              <a:rPr lang="en-US" sz="1600" dirty="0">
+                <a:solidFill>
+                  <a:schemeClr val="accent6"/>
+                </a:solidFill>
+              </a:rPr>
+              <a:t>Fast and efficient way of creating space for a routine</a:t>
+            </a:r>
           </a:p>
           <a:p>
             <a:pPr marL="285750" indent="-285750">
@@ -6633,13 +6643,16 @@
               <a:buChar char="•"/>
             </a:pPr>
             <a:r>
-              <a:rPr lang="en-US" sz="1200" dirty="0">
+              <a:rPr lang="en-US" sz="1600" dirty="0">
                 <a:solidFill>
                   <a:schemeClr val="accent6"/>
                 </a:solidFill>
               </a:rPr>
-              <a:t>Fast and efficient way of creating space for a routine</a:t>
-            </a:r>
+              <a:t>The memory is automatically freed</a:t>
+            </a:r>
+          </a:p>
+          <a:p>
+            <a:endParaRPr lang="en-US" sz="1600" dirty="0"/>
           </a:p>
           <a:p>
             <a:pPr marL="285750" indent="-285750">
@@ -6647,16 +6660,13 @@
               <a:buChar char="•"/>
             </a:pPr>
             <a:r>
-              <a:rPr lang="en-US" sz="1200" dirty="0">
-                <a:solidFill>
-                  <a:schemeClr val="accent6"/>
-                </a:solidFill>
-              </a:rPr>
-              <a:t>The memory is automatically freed</a:t>
-            </a:r>
-          </a:p>
-          <a:p>
-            <a:endParaRPr lang="en-US" sz="1200" dirty="0"/>
+              <a:rPr lang="en-US" sz="1600" dirty="0">
+                <a:solidFill>
+                  <a:srgbClr val="FF0000"/>
+                </a:solidFill>
+              </a:rPr>
+              <a:t>Limited space decided by operating system</a:t>
+            </a:r>
           </a:p>
           <a:p>
             <a:pPr marL="285750" indent="-285750">
@@ -6664,21 +6674,7 @@
               <a:buChar char="•"/>
             </a:pPr>
             <a:r>
-              <a:rPr lang="en-US" sz="1200" dirty="0">
-                <a:solidFill>
-                  <a:srgbClr val="FF0000"/>
-                </a:solidFill>
-              </a:rPr>
-              <a:t>Limited space decided by operating system</a:t>
-            </a:r>
-          </a:p>
-          <a:p>
-            <a:pPr marL="285750" indent="-285750">
-              <a:buFont typeface="Arial" panose="020B0604020202020204" pitchFamily="34" charset="0"/>
-              <a:buChar char="•"/>
-            </a:pPr>
-            <a:r>
-              <a:rPr lang="en-US" sz="1200" i="1" dirty="0">
+              <a:rPr lang="en-US" sz="1600" i="1" dirty="0">
                 <a:solidFill>
                   <a:srgbClr val="FF0000"/>
                 </a:solidFill>
@@ -6702,8 +6698,8 @@
         </p:nvSpPr>
         <p:spPr>
           <a:xfrm>
-            <a:off x="1860441" y="-814596"/>
-            <a:ext cx="559769" cy="261610"/>
+            <a:off x="1829154" y="-888016"/>
+            <a:ext cx="709105" cy="338554"/>
           </a:xfrm>
           <a:prstGeom prst="rect">
             <a:avLst/>
@@ -6717,13 +6713,18 @@
           <a:lstStyle/>
           <a:p>
             <a:r>
-              <a:rPr lang="en-US" sz="1100" b="1" dirty="0">
+              <a:rPr lang="en-US" sz="1600" b="1" dirty="0">
                 <a:solidFill>
                   <a:srgbClr val="7030A0"/>
                 </a:solidFill>
               </a:rPr>
               <a:t>STACK</a:t>
             </a:r>
+            <a:endParaRPr lang="en-US" sz="1100" b="1" dirty="0">
+              <a:solidFill>
+                <a:srgbClr val="7030A0"/>
+              </a:solidFill>
+            </a:endParaRPr>
           </a:p>
         </p:txBody>
       </p:sp>
@@ -6743,7 +6744,7 @@
         </p:nvCxnSpPr>
         <p:spPr>
           <a:xfrm>
-            <a:off x="1877110" y="-258346"/>
+            <a:off x="1874326" y="-236337"/>
             <a:ext cx="2542036" cy="0"/>
           </a:xfrm>
           <a:prstGeom prst="line">
@@ -6787,7 +6788,7 @@
         </p:nvCxnSpPr>
         <p:spPr>
           <a:xfrm>
-            <a:off x="1893779" y="8354"/>
+            <a:off x="1893779" y="73398"/>
             <a:ext cx="2542036" cy="0"/>
           </a:xfrm>
           <a:prstGeom prst="line">
@@ -6831,7 +6832,7 @@
         </p:nvCxnSpPr>
         <p:spPr>
           <a:xfrm>
-            <a:off x="1893779" y="290294"/>
+            <a:off x="1893779" y="390279"/>
             <a:ext cx="2542036" cy="0"/>
           </a:xfrm>
           <a:prstGeom prst="line">
@@ -6873,8 +6874,8 @@
         </p:nvSpPr>
         <p:spPr>
           <a:xfrm>
-            <a:off x="203893" y="-683791"/>
-            <a:ext cx="1715534" cy="261610"/>
+            <a:off x="4444682" y="-718739"/>
+            <a:ext cx="1727518" cy="584775"/>
           </a:xfrm>
           <a:prstGeom prst="rect">
             <a:avLst/>
@@ -6882,15 +6883,17 @@
           <a:noFill/>
         </p:spPr>
         <p:txBody>
-          <a:bodyPr wrap="none" rtlCol="0">
+          <a:bodyPr wrap="square" rtlCol="0">
             <a:spAutoFit/>
           </a:bodyPr>
           <a:lstStyle/>
           <a:p>
-            <a:r>
-              <a:rPr lang="en-US" sz="1100" dirty="0"/>
-              <a:t>Higher memory address →</a:t>
-            </a:r>
+            <a:pPr algn="ctr"/>
+            <a:r>
+              <a:rPr lang="en-US" sz="1600" dirty="0"/>
+              <a:t>← Higher memory address</a:t>
+            </a:r>
+            <a:endParaRPr lang="en-US" sz="1100" dirty="0"/>
           </a:p>
         </p:txBody>
       </p:sp>
@@ -6910,8 +6913,8 @@
         </p:nvCxnSpPr>
         <p:spPr>
           <a:xfrm>
-            <a:off x="3149557" y="-422181"/>
-            <a:ext cx="0" cy="1306835"/>
+            <a:off x="3351815" y="-394812"/>
+            <a:ext cx="0" cy="1394937"/>
           </a:xfrm>
           <a:prstGeom prst="straightConnector1">
             <a:avLst/>
@@ -6954,8 +6957,8 @@
         </p:nvSpPr>
         <p:spPr>
           <a:xfrm>
-            <a:off x="762063" y="433809"/>
-            <a:ext cx="1098378" cy="261610"/>
+            <a:off x="4474364" y="560890"/>
+            <a:ext cx="1558247" cy="338554"/>
           </a:xfrm>
           <a:prstGeom prst="rect">
             <a:avLst/>
@@ -6969,8 +6972,8 @@
           <a:lstStyle/>
           <a:p>
             <a:r>
-              <a:rPr lang="en-US" sz="1100" dirty="0"/>
-              <a:t>Stack pointer →</a:t>
+              <a:rPr lang="en-US" sz="1600" dirty="0"/>
+              <a:t>← Stack pointer</a:t>
             </a:r>
           </a:p>
         </p:txBody>
@@ -6991,7 +6994,7 @@
         </p:nvCxnSpPr>
         <p:spPr>
           <a:xfrm>
-            <a:off x="1893779" y="564614"/>
+            <a:off x="1893779" y="714779"/>
             <a:ext cx="2542036" cy="0"/>
           </a:xfrm>
           <a:prstGeom prst="line">
@@ -7034,7 +7037,7 @@
         <p:spPr>
           <a:xfrm>
             <a:off x="1863225" y="-540207"/>
-            <a:ext cx="960519" cy="246221"/>
+            <a:ext cx="1277914" cy="307777"/>
           </a:xfrm>
           <a:prstGeom prst="rect">
             <a:avLst/>
@@ -7048,12 +7051,12 @@
           <a:lstStyle/>
           <a:p>
             <a:r>
-              <a:rPr lang="en-US" sz="1000" dirty="0">
+              <a:rPr lang="en-US" sz="1400" dirty="0">
                 <a:latin typeface="Consolas" panose="020B0609020204030204" pitchFamily="49" charset="0"/>
               </a:rPr>
               <a:t>Routine A()</a:t>
             </a:r>
-            <a:endParaRPr lang="en-US" sz="1100" dirty="0">
+            <a:endParaRPr lang="en-US" dirty="0">
               <a:latin typeface="Consolas" panose="020B0609020204030204" pitchFamily="49" charset="0"/>
             </a:endParaRPr>
           </a:p>
@@ -7073,8 +7076,8 @@
         </p:nvSpPr>
         <p:spPr>
           <a:xfrm>
-            <a:off x="2058069" y="28833"/>
-            <a:ext cx="960519" cy="246221"/>
+            <a:off x="2058069" y="93877"/>
+            <a:ext cx="1277914" cy="307777"/>
           </a:xfrm>
           <a:prstGeom prst="rect">
             <a:avLst/>
@@ -7088,12 +7091,12 @@
           <a:lstStyle/>
           <a:p>
             <a:r>
-              <a:rPr lang="en-US" sz="1000" dirty="0">
+              <a:rPr lang="en-US" sz="1400" dirty="0">
                 <a:latin typeface="Consolas" panose="020B0609020204030204" pitchFamily="49" charset="0"/>
               </a:rPr>
               <a:t>Routine B()</a:t>
             </a:r>
-            <a:endParaRPr lang="en-US" sz="1100" dirty="0">
+            <a:endParaRPr lang="en-US" dirty="0">
               <a:latin typeface="Consolas" panose="020B0609020204030204" pitchFamily="49" charset="0"/>
             </a:endParaRPr>
           </a:p>
@@ -7113,8 +7116,8 @@
         </p:nvSpPr>
         <p:spPr>
           <a:xfrm>
-            <a:off x="1877110" y="-256923"/>
-            <a:ext cx="607859" cy="246221"/>
+            <a:off x="1893779" y="-236057"/>
+            <a:ext cx="780983" cy="307777"/>
           </a:xfrm>
           <a:prstGeom prst="rect">
             <a:avLst/>
@@ -7128,24 +7131,24 @@
           <a:lstStyle/>
           <a:p>
             <a:r>
-              <a:rPr lang="en-US" sz="1000" dirty="0">
+              <a:rPr lang="en-US" sz="1400" dirty="0">
                 <a:latin typeface="Consolas" panose="020B0609020204030204" pitchFamily="49" charset="0"/>
               </a:rPr>
               <a:t>C(</a:t>
             </a:r>
             <a:r>
-              <a:rPr lang="en-US" sz="1000" dirty="0" err="1">
+              <a:rPr lang="en-US" sz="1400" dirty="0" err="1">
                 <a:latin typeface="Consolas" panose="020B0609020204030204" pitchFamily="49" charset="0"/>
               </a:rPr>
               <a:t>n,n</a:t>
             </a:r>
             <a:r>
-              <a:rPr lang="en-US" sz="1000" dirty="0">
+              <a:rPr lang="en-US" sz="1400" dirty="0">
                 <a:latin typeface="Consolas" panose="020B0609020204030204" pitchFamily="49" charset="0"/>
               </a:rPr>
               <a:t>)</a:t>
             </a:r>
-            <a:endParaRPr lang="en-US" sz="1100" dirty="0">
+            <a:endParaRPr lang="en-US" dirty="0">
               <a:latin typeface="Consolas" panose="020B0609020204030204" pitchFamily="49" charset="0"/>
             </a:endParaRPr>
           </a:p>
@@ -7165,8 +7168,8 @@
         </p:nvSpPr>
         <p:spPr>
           <a:xfrm>
-            <a:off x="2058069" y="306957"/>
-            <a:ext cx="466794" cy="246221"/>
+            <a:off x="2066394" y="407002"/>
+            <a:ext cx="582211" cy="307777"/>
           </a:xfrm>
           <a:prstGeom prst="rect">
             <a:avLst/>
@@ -7180,12 +7183,12 @@
           <a:lstStyle/>
           <a:p>
             <a:r>
-              <a:rPr lang="en-US" sz="1000" dirty="0">
+              <a:rPr lang="en-US" sz="1400" dirty="0">
                 <a:latin typeface="Consolas" panose="020B0609020204030204" pitchFamily="49" charset="0"/>
               </a:rPr>
               <a:t>b(n)</a:t>
             </a:r>
-            <a:endParaRPr lang="en-US" sz="1100" dirty="0">
+            <a:endParaRPr lang="en-US" dirty="0">
               <a:latin typeface="Consolas" panose="020B0609020204030204" pitchFamily="49" charset="0"/>
             </a:endParaRPr>
           </a:p>

</xml_diff>